<commit_message>
PPBot will now reopen automatically when it wasn't closed by the app. Also included some changes on the example presentations as well as an updated readme and install instructions.
</commit_message>
<xml_diff>
--- a/files/templates/example.pptx
+++ b/files/templates/example.pptx
@@ -6,16 +6,16 @@
   </p:sldMasterIdLst>
   <p:sldIdLst>
     <p:sldId id="256" r:id="rId2"/>
-    <p:sldId id="257" r:id="rId3"/>
-    <p:sldId id="258" r:id="rId4"/>
-    <p:sldId id="259" r:id="rId5"/>
-    <p:sldId id="260" r:id="rId6"/>
-    <p:sldId id="261" r:id="rId7"/>
-    <p:sldId id="262" r:id="rId8"/>
-    <p:sldId id="263" r:id="rId9"/>
-    <p:sldId id="264" r:id="rId10"/>
-    <p:sldId id="265" r:id="rId11"/>
-    <p:sldId id="266" r:id="rId12"/>
+    <p:sldId id="265" r:id="rId3"/>
+    <p:sldId id="266" r:id="rId4"/>
+    <p:sldId id="257" r:id="rId5"/>
+    <p:sldId id="258" r:id="rId6"/>
+    <p:sldId id="259" r:id="rId7"/>
+    <p:sldId id="260" r:id="rId8"/>
+    <p:sldId id="261" r:id="rId9"/>
+    <p:sldId id="262" r:id="rId10"/>
+    <p:sldId id="263" r:id="rId11"/>
+    <p:sldId id="264" r:id="rId12"/>
     <p:sldId id="267" r:id="rId13"/>
     <p:sldId id="268" r:id="rId14"/>
   </p:sldIdLst>
@@ -253,7 +253,7 @@
           <a:p>
             <a:fld id="{1BA50D42-C9CD-4801-B293-61D1F53EC57E}" type="datetimeFigureOut">
               <a:rPr lang="de-DE" smtClean="0"/>
-              <a:t>30.09.2015</a:t>
+              <a:t>07.10.2015</a:t>
             </a:fld>
             <a:endParaRPr lang="de-DE"/>
           </a:p>
@@ -566,7 +566,7 @@
           <a:p>
             <a:fld id="{1BA50D42-C9CD-4801-B293-61D1F53EC57E}" type="datetimeFigureOut">
               <a:rPr lang="de-DE" smtClean="0"/>
-              <a:t>30.09.2015</a:t>
+              <a:t>07.10.2015</a:t>
             </a:fld>
             <a:endParaRPr lang="de-DE"/>
           </a:p>
@@ -751,7 +751,7 @@
           <a:p>
             <a:fld id="{1BA50D42-C9CD-4801-B293-61D1F53EC57E}" type="datetimeFigureOut">
               <a:rPr lang="de-DE" smtClean="0"/>
-              <a:t>30.09.2015</a:t>
+              <a:t>07.10.2015</a:t>
             </a:fld>
             <a:endParaRPr lang="de-DE"/>
           </a:p>
@@ -926,7 +926,7 @@
           <a:p>
             <a:fld id="{1BA50D42-C9CD-4801-B293-61D1F53EC57E}" type="datetimeFigureOut">
               <a:rPr lang="de-DE" smtClean="0"/>
-              <a:t>30.09.2015</a:t>
+              <a:t>07.10.2015</a:t>
             </a:fld>
             <a:endParaRPr lang="de-DE"/>
           </a:p>
@@ -1194,7 +1194,7 @@
           <a:p>
             <a:fld id="{1BA50D42-C9CD-4801-B293-61D1F53EC57E}" type="datetimeFigureOut">
               <a:rPr lang="de-DE" smtClean="0"/>
-              <a:t>30.09.2015</a:t>
+              <a:t>07.10.2015</a:t>
             </a:fld>
             <a:endParaRPr lang="de-DE"/>
           </a:p>
@@ -1662,7 +1662,7 @@
           <a:p>
             <a:fld id="{1BA50D42-C9CD-4801-B293-61D1F53EC57E}" type="datetimeFigureOut">
               <a:rPr lang="de-DE" smtClean="0"/>
-              <a:t>30.09.2015</a:t>
+              <a:t>07.10.2015</a:t>
             </a:fld>
             <a:endParaRPr lang="de-DE"/>
           </a:p>
@@ -2151,7 +2151,7 @@
           <a:p>
             <a:fld id="{1BA50D42-C9CD-4801-B293-61D1F53EC57E}" type="datetimeFigureOut">
               <a:rPr lang="de-DE" smtClean="0"/>
-              <a:t>30.09.2015</a:t>
+              <a:t>07.10.2015</a:t>
             </a:fld>
             <a:endParaRPr lang="de-DE"/>
           </a:p>
@@ -2277,7 +2277,7 @@
           <a:p>
             <a:fld id="{1BA50D42-C9CD-4801-B293-61D1F53EC57E}" type="datetimeFigureOut">
               <a:rPr lang="de-DE" smtClean="0"/>
-              <a:t>30.09.2015</a:t>
+              <a:t>07.10.2015</a:t>
             </a:fld>
             <a:endParaRPr lang="de-DE"/>
           </a:p>
@@ -2421,7 +2421,7 @@
           <a:p>
             <a:fld id="{1BA50D42-C9CD-4801-B293-61D1F53EC57E}" type="datetimeFigureOut">
               <a:rPr lang="de-DE" smtClean="0"/>
-              <a:t>30.09.2015</a:t>
+              <a:t>07.10.2015</a:t>
             </a:fld>
             <a:endParaRPr lang="de-DE"/>
           </a:p>
@@ -2743,7 +2743,7 @@
           <a:p>
             <a:fld id="{1BA50D42-C9CD-4801-B293-61D1F53EC57E}" type="datetimeFigureOut">
               <a:rPr lang="de-DE" smtClean="0"/>
-              <a:t>30.09.2015</a:t>
+              <a:t>07.10.2015</a:t>
             </a:fld>
             <a:endParaRPr lang="de-DE"/>
           </a:p>
@@ -2877,7 +2877,7 @@
           <a:p>
             <a:fld id="{1BA50D42-C9CD-4801-B293-61D1F53EC57E}" type="datetimeFigureOut">
               <a:rPr lang="de-DE" smtClean="0"/>
-              <a:t>30.09.2015</a:t>
+              <a:t>07.10.2015</a:t>
             </a:fld>
             <a:endParaRPr lang="de-DE"/>
           </a:p>
@@ -3658,7 +3658,7 @@
           <a:p>
             <a:fld id="{1BA50D42-C9CD-4801-B293-61D1F53EC57E}" type="datetimeFigureOut">
               <a:rPr lang="de-DE" smtClean="0"/>
-              <a:t>30.09.2015</a:t>
+              <a:t>07.10.2015</a:t>
             </a:fld>
             <a:endParaRPr lang="de-DE"/>
           </a:p>
@@ -4271,7 +4271,11 @@
           <a:p>
             <a:r>
               <a:rPr lang="en-GB" dirty="0" smtClean="0"/>
-              <a:t>3.0 Prepare presentation</a:t>
+              <a:t>3.2 </a:t>
+            </a:r>
+            <a:r>
+              <a:rPr lang="en-GB" dirty="0" smtClean="0"/>
+              <a:t>Map network drive</a:t>
             </a:r>
             <a:endParaRPr lang="en-GB" dirty="0"/>
           </a:p>
@@ -4289,41 +4293,31 @@
         </p:nvSpPr>
         <p:spPr/>
         <p:txBody>
-          <a:bodyPr/>
+          <a:bodyPr>
+            <a:normAutofit/>
+          </a:bodyPr>
           <a:lstStyle/>
           <a:p>
             <a:r>
-              <a:rPr lang="de-CH" dirty="0" smtClean="0"/>
-              <a:t>Go </a:t>
-            </a:r>
-            <a:r>
-              <a:rPr lang="de-CH" dirty="0" err="1" smtClean="0"/>
-              <a:t>to</a:t>
-            </a:r>
-            <a:r>
-              <a:rPr lang="de-CH" dirty="0" smtClean="0"/>
-              <a:t> «SLIDE SHOW»</a:t>
-            </a:r>
-          </a:p>
-          <a:p>
-            <a:r>
-              <a:rPr lang="de-CH" dirty="0" smtClean="0"/>
-              <a:t>Click «Set </a:t>
-            </a:r>
-            <a:r>
-              <a:rPr lang="de-CH" dirty="0" err="1" smtClean="0"/>
-              <a:t>Up</a:t>
-            </a:r>
-            <a:r>
-              <a:rPr lang="de-CH" dirty="0" smtClean="0"/>
-              <a:t> Slide Show»</a:t>
-            </a:r>
+              <a:rPr lang="en-GB" sz="2800" dirty="0" smtClean="0"/>
+              <a:t>Enter the username from the other computer as well as password</a:t>
+            </a:r>
+          </a:p>
+          <a:p>
+            <a:endParaRPr lang="en-GB" sz="2800" dirty="0" smtClean="0"/>
+          </a:p>
+          <a:p>
+            <a:r>
+              <a:rPr lang="en-GB" sz="2800" dirty="0" smtClean="0"/>
+              <a:t>Check the box below</a:t>
+            </a:r>
+            <a:endParaRPr lang="en-GB" sz="2800" dirty="0"/>
           </a:p>
         </p:txBody>
       </p:sp>
       <p:pic>
         <p:nvPicPr>
-          <p:cNvPr id="9219" name="Picture 3" descr="C:\Users\nexolight\Desktop\Share\Untitled.png"/>
+          <p:cNvPr id="7170" name="Picture 2" descr="C:\Users\nexolight\Desktop\Share\3.PNG"/>
           <p:cNvPicPr>
             <a:picLocks noChangeAspect="1" noChangeArrowheads="1"/>
           </p:cNvPicPr>
@@ -4344,8 +4338,8 @@
         </p:blipFill>
         <p:spPr bwMode="auto">
           <a:xfrm>
-            <a:off x="1628824" y="3476253"/>
-            <a:ext cx="6270625" cy="1390650"/>
+            <a:off x="4139952" y="4005064"/>
+            <a:ext cx="3695700" cy="1428750"/>
           </a:xfrm>
           <a:prstGeom prst="rect">
             <a:avLst/>
@@ -4365,7 +4359,7 @@
     </p:spTree>
     <p:extLst>
       <p:ext uri="{BB962C8B-B14F-4D97-AF65-F5344CB8AC3E}">
-        <p14:creationId xmlns:p14="http://schemas.microsoft.com/office/powerpoint/2010/main" val="1657501375"/>
+        <p14:creationId xmlns:p14="http://schemas.microsoft.com/office/powerpoint/2010/main" val="3109221976"/>
       </p:ext>
     </p:extLst>
   </p:cSld>
@@ -4416,7 +4410,11 @@
           <a:p>
             <a:r>
               <a:rPr lang="en-GB" dirty="0" smtClean="0"/>
-              <a:t>3.1 Prepare presentation</a:t>
+              <a:t>3.3 </a:t>
+            </a:r>
+            <a:r>
+              <a:rPr lang="en-GB" dirty="0" smtClean="0"/>
+              <a:t>Map network drive</a:t>
             </a:r>
             <a:endParaRPr lang="en-GB" dirty="0"/>
           </a:p>
@@ -4438,23 +4436,78 @@
           <a:lstStyle/>
           <a:p>
             <a:r>
-              <a:rPr lang="en-GB" dirty="0" smtClean="0"/>
-              <a:t>Check the «Loop» box</a:t>
-            </a:r>
-          </a:p>
-          <a:p>
-            <a:pPr lvl="1"/>
-            <a:r>
-              <a:rPr lang="en-GB" dirty="0" smtClean="0"/>
-              <a:t>That’s all</a:t>
-            </a:r>
-            <a:endParaRPr lang="en-GB" dirty="0"/>
+              <a:rPr lang="de-CH" dirty="0" err="1" smtClean="0"/>
+              <a:t>You</a:t>
+            </a:r>
+            <a:r>
+              <a:rPr lang="de-CH" dirty="0" smtClean="0"/>
+              <a:t> </a:t>
+            </a:r>
+            <a:r>
+              <a:rPr lang="de-CH" dirty="0" err="1" smtClean="0"/>
+              <a:t>should</a:t>
+            </a:r>
+            <a:r>
+              <a:rPr lang="de-CH" dirty="0" smtClean="0"/>
+              <a:t> </a:t>
+            </a:r>
+            <a:r>
+              <a:rPr lang="de-CH" dirty="0" err="1" smtClean="0"/>
+              <a:t>be</a:t>
+            </a:r>
+            <a:r>
+              <a:rPr lang="de-CH" dirty="0" smtClean="0"/>
+              <a:t> </a:t>
+            </a:r>
+            <a:r>
+              <a:rPr lang="de-CH" dirty="0" err="1" smtClean="0"/>
+              <a:t>done</a:t>
+            </a:r>
+            <a:r>
+              <a:rPr lang="de-CH" dirty="0" smtClean="0"/>
+              <a:t> </a:t>
+            </a:r>
+            <a:r>
+              <a:rPr lang="de-CH" dirty="0" err="1" smtClean="0"/>
+              <a:t>if</a:t>
+            </a:r>
+            <a:r>
+              <a:rPr lang="de-CH" dirty="0" smtClean="0"/>
+              <a:t> </a:t>
+            </a:r>
+            <a:r>
+              <a:rPr lang="de-CH" dirty="0" err="1" smtClean="0"/>
+              <a:t>drive</a:t>
+            </a:r>
+            <a:r>
+              <a:rPr lang="de-CH" dirty="0" smtClean="0"/>
+              <a:t> Z </a:t>
+            </a:r>
+            <a:r>
+              <a:rPr lang="de-CH" dirty="0" err="1" smtClean="0"/>
+              <a:t>appears</a:t>
+            </a:r>
+            <a:r>
+              <a:rPr lang="de-CH" dirty="0" smtClean="0"/>
+              <a:t> in «</a:t>
+            </a:r>
+            <a:r>
+              <a:rPr lang="de-CH" dirty="0" err="1" smtClean="0"/>
+              <a:t>My</a:t>
+            </a:r>
+            <a:r>
+              <a:rPr lang="de-CH" dirty="0" smtClean="0"/>
+              <a:t> Computer»</a:t>
+            </a:r>
+          </a:p>
+          <a:p>
+            <a:endParaRPr lang="de-CH" dirty="0"/>
           </a:p>
         </p:txBody>
       </p:sp>
       <p:pic>
         <p:nvPicPr>
-          <p:cNvPr id="10242" name="Picture 2" descr="C:\Users\nexolight\Desktop\Share\Untitled2.png"/>
+          <p:cNvPr id="8195" name="Picture 3" descr="C:\Users\nexolight\Desktop\x.png"/>
           <p:cNvPicPr>
             <a:picLocks noChangeAspect="1" noChangeArrowheads="1"/>
           </p:cNvPicPr>
@@ -4475,8 +4528,8 @@
         </p:blipFill>
         <p:spPr bwMode="auto">
           <a:xfrm>
-            <a:off x="3995936" y="2780928"/>
-            <a:ext cx="4078238" cy="3070134"/>
+            <a:off x="5076056" y="4365104"/>
+            <a:ext cx="2505075" cy="914400"/>
           </a:xfrm>
           <a:prstGeom prst="rect">
             <a:avLst/>
@@ -4496,7 +4549,7 @@
     </p:spTree>
     <p:extLst>
       <p:ext uri="{BB962C8B-B14F-4D97-AF65-F5344CB8AC3E}">
-        <p14:creationId xmlns:p14="http://schemas.microsoft.com/office/powerpoint/2010/main" val="3229214354"/>
+        <p14:creationId xmlns:p14="http://schemas.microsoft.com/office/powerpoint/2010/main" val="733535802"/>
       </p:ext>
     </p:extLst>
   </p:cSld>
@@ -5026,8 +5079,296 @@
           <a:lstStyle/>
           <a:p>
             <a:r>
+              <a:rPr lang="en-GB" dirty="0" smtClean="0"/>
+              <a:t>1.0 </a:t>
+            </a:r>
+            <a:r>
+              <a:rPr lang="en-GB" dirty="0" smtClean="0"/>
+              <a:t>Prepare presentation</a:t>
+            </a:r>
+            <a:endParaRPr lang="en-GB" dirty="0"/>
+          </a:p>
+        </p:txBody>
+      </p:sp>
+      <p:sp>
+        <p:nvSpPr>
+          <p:cNvPr id="3" name="Inhaltsplatzhalter 2"/>
+          <p:cNvSpPr>
+            <a:spLocks noGrp="1"/>
+          </p:cNvSpPr>
+          <p:nvPr>
+            <p:ph idx="1"/>
+          </p:nvPr>
+        </p:nvSpPr>
+        <p:spPr/>
+        <p:txBody>
+          <a:bodyPr/>
+          <a:lstStyle/>
+          <a:p>
+            <a:r>
               <a:rPr lang="de-CH" dirty="0" smtClean="0"/>
-              <a:t>1.0 Share a </a:t>
+              <a:t>Go </a:t>
+            </a:r>
+            <a:r>
+              <a:rPr lang="de-CH" dirty="0" err="1" smtClean="0"/>
+              <a:t>to</a:t>
+            </a:r>
+            <a:r>
+              <a:rPr lang="de-CH" dirty="0" smtClean="0"/>
+              <a:t> «SLIDE SHOW»</a:t>
+            </a:r>
+          </a:p>
+          <a:p>
+            <a:r>
+              <a:rPr lang="de-CH" dirty="0" smtClean="0"/>
+              <a:t>Click «Set </a:t>
+            </a:r>
+            <a:r>
+              <a:rPr lang="de-CH" dirty="0" err="1" smtClean="0"/>
+              <a:t>Up</a:t>
+            </a:r>
+            <a:r>
+              <a:rPr lang="de-CH" dirty="0" smtClean="0"/>
+              <a:t> Slide Show»</a:t>
+            </a:r>
+          </a:p>
+        </p:txBody>
+      </p:sp>
+      <p:pic>
+        <p:nvPicPr>
+          <p:cNvPr id="9219" name="Picture 3" descr="C:\Users\nexolight\Desktop\Share\Untitled.png"/>
+          <p:cNvPicPr>
+            <a:picLocks noChangeAspect="1" noChangeArrowheads="1"/>
+          </p:cNvPicPr>
+          <p:nvPr/>
+        </p:nvPicPr>
+        <p:blipFill>
+          <a:blip r:embed="rId2">
+            <a:extLst>
+              <a:ext uri="{28A0092B-C50C-407E-A947-70E740481C1C}">
+                <a14:useLocalDpi xmlns:a14="http://schemas.microsoft.com/office/drawing/2010/main" val="0"/>
+              </a:ext>
+            </a:extLst>
+          </a:blip>
+          <a:srcRect/>
+          <a:stretch>
+            <a:fillRect/>
+          </a:stretch>
+        </p:blipFill>
+        <p:spPr bwMode="auto">
+          <a:xfrm>
+            <a:off x="1628824" y="3476253"/>
+            <a:ext cx="6270625" cy="1390650"/>
+          </a:xfrm>
+          <a:prstGeom prst="rect">
+            <a:avLst/>
+          </a:prstGeom>
+          <a:noFill/>
+          <a:extLst>
+            <a:ext uri="{909E8E84-426E-40DD-AFC4-6F175D3DCCD1}">
+              <a14:hiddenFill xmlns:a14="http://schemas.microsoft.com/office/drawing/2010/main">
+                <a:solidFill>
+                  <a:srgbClr val="FFFFFF"/>
+                </a:solidFill>
+              </a14:hiddenFill>
+            </a:ext>
+          </a:extLst>
+        </p:spPr>
+      </p:pic>
+    </p:spTree>
+    <p:extLst>
+      <p:ext uri="{BB962C8B-B14F-4D97-AF65-F5344CB8AC3E}">
+        <p14:creationId xmlns:p14="http://schemas.microsoft.com/office/powerpoint/2010/main" val="1657501375"/>
+      </p:ext>
+    </p:extLst>
+  </p:cSld>
+  <p:clrMapOvr>
+    <a:masterClrMapping/>
+  </p:clrMapOvr>
+  <p:timing>
+    <p:tnLst>
+      <p:par>
+        <p:cTn id="1" dur="indefinite" restart="never" nodeType="tmRoot"/>
+      </p:par>
+    </p:tnLst>
+  </p:timing>
+</p:sld>
+</file>
+
+<file path=ppt/slides/slide3.xml><?xml version="1.0" encoding="utf-8"?>
+<p:sld xmlns:a="http://schemas.openxmlformats.org/drawingml/2006/main" xmlns:r="http://schemas.openxmlformats.org/officeDocument/2006/relationships" xmlns:p="http://schemas.openxmlformats.org/presentationml/2006/main">
+  <p:cSld>
+    <p:spTree>
+      <p:nvGrpSpPr>
+        <p:cNvPr id="1" name=""/>
+        <p:cNvGrpSpPr/>
+        <p:nvPr/>
+      </p:nvGrpSpPr>
+      <p:grpSpPr>
+        <a:xfrm>
+          <a:off x="0" y="0"/>
+          <a:ext cx="0" cy="0"/>
+          <a:chOff x="0" y="0"/>
+          <a:chExt cx="0" cy="0"/>
+        </a:xfrm>
+      </p:grpSpPr>
+      <p:sp>
+        <p:nvSpPr>
+          <p:cNvPr id="2" name="Titel 1"/>
+          <p:cNvSpPr>
+            <a:spLocks noGrp="1"/>
+          </p:cNvSpPr>
+          <p:nvPr>
+            <p:ph type="title"/>
+          </p:nvPr>
+        </p:nvSpPr>
+        <p:spPr/>
+        <p:txBody>
+          <a:bodyPr/>
+          <a:lstStyle/>
+          <a:p>
+            <a:r>
+              <a:rPr lang="en-GB" dirty="0" smtClean="0"/>
+              <a:t>1.1 </a:t>
+            </a:r>
+            <a:r>
+              <a:rPr lang="en-GB" dirty="0" smtClean="0"/>
+              <a:t>Prepare presentation</a:t>
+            </a:r>
+            <a:endParaRPr lang="en-GB" dirty="0"/>
+          </a:p>
+        </p:txBody>
+      </p:sp>
+      <p:sp>
+        <p:nvSpPr>
+          <p:cNvPr id="3" name="Inhaltsplatzhalter 2"/>
+          <p:cNvSpPr>
+            <a:spLocks noGrp="1"/>
+          </p:cNvSpPr>
+          <p:nvPr>
+            <p:ph idx="1"/>
+          </p:nvPr>
+        </p:nvSpPr>
+        <p:spPr/>
+        <p:txBody>
+          <a:bodyPr/>
+          <a:lstStyle/>
+          <a:p>
+            <a:r>
+              <a:rPr lang="en-GB" dirty="0" smtClean="0"/>
+              <a:t>Check the «Loop» box</a:t>
+            </a:r>
+          </a:p>
+          <a:p>
+            <a:pPr lvl="1"/>
+            <a:r>
+              <a:rPr lang="en-GB" dirty="0" smtClean="0"/>
+              <a:t>That’s all</a:t>
+            </a:r>
+            <a:endParaRPr lang="en-GB" dirty="0"/>
+          </a:p>
+        </p:txBody>
+      </p:sp>
+      <p:pic>
+        <p:nvPicPr>
+          <p:cNvPr id="10242" name="Picture 2" descr="C:\Users\nexolight\Desktop\Share\Untitled2.png"/>
+          <p:cNvPicPr>
+            <a:picLocks noChangeAspect="1" noChangeArrowheads="1"/>
+          </p:cNvPicPr>
+          <p:nvPr/>
+        </p:nvPicPr>
+        <p:blipFill>
+          <a:blip r:embed="rId2">
+            <a:extLst>
+              <a:ext uri="{28A0092B-C50C-407E-A947-70E740481C1C}">
+                <a14:useLocalDpi xmlns:a14="http://schemas.microsoft.com/office/drawing/2010/main" val="0"/>
+              </a:ext>
+            </a:extLst>
+          </a:blip>
+          <a:srcRect/>
+          <a:stretch>
+            <a:fillRect/>
+          </a:stretch>
+        </p:blipFill>
+        <p:spPr bwMode="auto">
+          <a:xfrm>
+            <a:off x="3995936" y="2780928"/>
+            <a:ext cx="4078238" cy="3070134"/>
+          </a:xfrm>
+          <a:prstGeom prst="rect">
+            <a:avLst/>
+          </a:prstGeom>
+          <a:noFill/>
+          <a:extLst>
+            <a:ext uri="{909E8E84-426E-40DD-AFC4-6F175D3DCCD1}">
+              <a14:hiddenFill xmlns:a14="http://schemas.microsoft.com/office/drawing/2010/main">
+                <a:solidFill>
+                  <a:srgbClr val="FFFFFF"/>
+                </a:solidFill>
+              </a14:hiddenFill>
+            </a:ext>
+          </a:extLst>
+        </p:spPr>
+      </p:pic>
+    </p:spTree>
+    <p:extLst>
+      <p:ext uri="{BB962C8B-B14F-4D97-AF65-F5344CB8AC3E}">
+        <p14:creationId xmlns:p14="http://schemas.microsoft.com/office/powerpoint/2010/main" val="3229214354"/>
+      </p:ext>
+    </p:extLst>
+  </p:cSld>
+  <p:clrMapOvr>
+    <a:masterClrMapping/>
+  </p:clrMapOvr>
+  <p:timing>
+    <p:tnLst>
+      <p:par>
+        <p:cTn id="1" dur="indefinite" restart="never" nodeType="tmRoot"/>
+      </p:par>
+    </p:tnLst>
+  </p:timing>
+</p:sld>
+</file>
+
+<file path=ppt/slides/slide4.xml><?xml version="1.0" encoding="utf-8"?>
+<p:sld xmlns:a="http://schemas.openxmlformats.org/drawingml/2006/main" xmlns:r="http://schemas.openxmlformats.org/officeDocument/2006/relationships" xmlns:p="http://schemas.openxmlformats.org/presentationml/2006/main">
+  <p:cSld>
+    <p:spTree>
+      <p:nvGrpSpPr>
+        <p:cNvPr id="1" name=""/>
+        <p:cNvGrpSpPr/>
+        <p:nvPr/>
+      </p:nvGrpSpPr>
+      <p:grpSpPr>
+        <a:xfrm>
+          <a:off x="0" y="0"/>
+          <a:ext cx="0" cy="0"/>
+          <a:chOff x="0" y="0"/>
+          <a:chExt cx="0" cy="0"/>
+        </a:xfrm>
+      </p:grpSpPr>
+      <p:sp>
+        <p:nvSpPr>
+          <p:cNvPr id="2" name="Titel 1"/>
+          <p:cNvSpPr>
+            <a:spLocks noGrp="1"/>
+          </p:cNvSpPr>
+          <p:nvPr>
+            <p:ph type="title"/>
+          </p:nvPr>
+        </p:nvSpPr>
+        <p:spPr/>
+        <p:txBody>
+          <a:bodyPr/>
+          <a:lstStyle/>
+          <a:p>
+            <a:r>
+              <a:rPr lang="de-CH" dirty="0" smtClean="0"/>
+              <a:t>2.0 </a:t>
+            </a:r>
+            <a:r>
+              <a:rPr lang="de-CH" dirty="0" smtClean="0"/>
+              <a:t>Share a </a:t>
             </a:r>
             <a:r>
               <a:rPr lang="de-CH" dirty="0" err="1" smtClean="0"/>
@@ -5165,7 +5506,7 @@
 </p:sld>
 </file>
 
-<file path=ppt/slides/slide3.xml><?xml version="1.0" encoding="utf-8"?>
+<file path=ppt/slides/slide5.xml><?xml version="1.0" encoding="utf-8"?>
 <p:sld xmlns:a="http://schemas.openxmlformats.org/drawingml/2006/main" xmlns:r="http://schemas.openxmlformats.org/officeDocument/2006/relationships" xmlns:p="http://schemas.openxmlformats.org/presentationml/2006/main">
   <p:cSld>
     <p:spTree>
@@ -5199,7 +5540,11 @@
           <a:p>
             <a:r>
               <a:rPr lang="de-CH" dirty="0" smtClean="0"/>
-              <a:t>1.1 Share a </a:t>
+              <a:t>2.1 </a:t>
+            </a:r>
+            <a:r>
+              <a:rPr lang="de-CH" dirty="0" smtClean="0"/>
+              <a:t>Share a </a:t>
             </a:r>
             <a:r>
               <a:rPr lang="de-CH" dirty="0" err="1" smtClean="0"/>
@@ -5299,7 +5644,7 @@
 </p:sld>
 </file>
 
-<file path=ppt/slides/slide4.xml><?xml version="1.0" encoding="utf-8"?>
+<file path=ppt/slides/slide6.xml><?xml version="1.0" encoding="utf-8"?>
 <p:sld xmlns:a="http://schemas.openxmlformats.org/drawingml/2006/main" xmlns:r="http://schemas.openxmlformats.org/officeDocument/2006/relationships" xmlns:p="http://schemas.openxmlformats.org/presentationml/2006/main">
   <p:cSld>
     <p:spTree>
@@ -5333,7 +5678,11 @@
           <a:p>
             <a:r>
               <a:rPr lang="de-CH" dirty="0" smtClean="0"/>
-              <a:t>1.2 Share a </a:t>
+              <a:t>2.2 </a:t>
+            </a:r>
+            <a:r>
+              <a:rPr lang="de-CH" dirty="0" smtClean="0"/>
+              <a:t>Share a </a:t>
             </a:r>
             <a:r>
               <a:rPr lang="de-CH" dirty="0" err="1" smtClean="0"/>
@@ -5439,7 +5788,7 @@
 </p:sld>
 </file>
 
-<file path=ppt/slides/slide5.xml><?xml version="1.0" encoding="utf-8"?>
+<file path=ppt/slides/slide7.xml><?xml version="1.0" encoding="utf-8"?>
 <p:sld xmlns:a="http://schemas.openxmlformats.org/drawingml/2006/main" xmlns:r="http://schemas.openxmlformats.org/officeDocument/2006/relationships" xmlns:p="http://schemas.openxmlformats.org/presentationml/2006/main">
   <p:cSld>
     <p:spTree>
@@ -5473,7 +5822,11 @@
           <a:p>
             <a:r>
               <a:rPr lang="de-CH" dirty="0" smtClean="0"/>
-              <a:t>1.3 Share a </a:t>
+              <a:t>2.3 </a:t>
+            </a:r>
+            <a:r>
+              <a:rPr lang="de-CH" dirty="0" smtClean="0"/>
+              <a:t>Share a </a:t>
             </a:r>
             <a:r>
               <a:rPr lang="de-CH" dirty="0" err="1" smtClean="0"/>
@@ -5593,7 +5946,7 @@
 </p:sld>
 </file>
 
-<file path=ppt/slides/slide6.xml><?xml version="1.0" encoding="utf-8"?>
+<file path=ppt/slides/slide8.xml><?xml version="1.0" encoding="utf-8"?>
 <p:sld xmlns:a="http://schemas.openxmlformats.org/drawingml/2006/main" xmlns:r="http://schemas.openxmlformats.org/officeDocument/2006/relationships" xmlns:p="http://schemas.openxmlformats.org/presentationml/2006/main">
   <p:cSld>
     <p:spTree>
@@ -5627,7 +5980,11 @@
           <a:p>
             <a:r>
               <a:rPr lang="en-GB" dirty="0" smtClean="0"/>
-              <a:t>2.0 Map network drive</a:t>
+              <a:t>3.0 </a:t>
+            </a:r>
+            <a:r>
+              <a:rPr lang="en-GB" dirty="0" smtClean="0"/>
+              <a:t>Map network drive</a:t>
             </a:r>
             <a:endParaRPr lang="en-GB" dirty="0"/>
           </a:p>
@@ -5740,7 +6097,7 @@
 </p:sld>
 </file>
 
-<file path=ppt/slides/slide7.xml><?xml version="1.0" encoding="utf-8"?>
+<file path=ppt/slides/slide9.xml><?xml version="1.0" encoding="utf-8"?>
 <p:sld xmlns:a="http://schemas.openxmlformats.org/drawingml/2006/main" xmlns:r="http://schemas.openxmlformats.org/officeDocument/2006/relationships" xmlns:p="http://schemas.openxmlformats.org/presentationml/2006/main">
   <p:cSld>
     <p:spTree>
@@ -5774,7 +6131,11 @@
           <a:p>
             <a:r>
               <a:rPr lang="en-GB" dirty="0" smtClean="0"/>
-              <a:t>2.1 Map network drive</a:t>
+              <a:t>3.1 </a:t>
+            </a:r>
+            <a:r>
+              <a:rPr lang="en-GB" dirty="0" smtClean="0"/>
+              <a:t>Map network drive</a:t>
             </a:r>
             <a:endParaRPr lang="en-GB" dirty="0"/>
           </a:p>
@@ -5875,327 +6236,6 @@
     <p:extLst>
       <p:ext uri="{BB962C8B-B14F-4D97-AF65-F5344CB8AC3E}">
         <p14:creationId xmlns:p14="http://schemas.microsoft.com/office/powerpoint/2010/main" val="951440083"/>
-      </p:ext>
-    </p:extLst>
-  </p:cSld>
-  <p:clrMapOvr>
-    <a:masterClrMapping/>
-  </p:clrMapOvr>
-  <p:timing>
-    <p:tnLst>
-      <p:par>
-        <p:cTn id="1" dur="indefinite" restart="never" nodeType="tmRoot"/>
-      </p:par>
-    </p:tnLst>
-  </p:timing>
-</p:sld>
-</file>
-
-<file path=ppt/slides/slide8.xml><?xml version="1.0" encoding="utf-8"?>
-<p:sld xmlns:a="http://schemas.openxmlformats.org/drawingml/2006/main" xmlns:r="http://schemas.openxmlformats.org/officeDocument/2006/relationships" xmlns:p="http://schemas.openxmlformats.org/presentationml/2006/main">
-  <p:cSld>
-    <p:spTree>
-      <p:nvGrpSpPr>
-        <p:cNvPr id="1" name=""/>
-        <p:cNvGrpSpPr/>
-        <p:nvPr/>
-      </p:nvGrpSpPr>
-      <p:grpSpPr>
-        <a:xfrm>
-          <a:off x="0" y="0"/>
-          <a:ext cx="0" cy="0"/>
-          <a:chOff x="0" y="0"/>
-          <a:chExt cx="0" cy="0"/>
-        </a:xfrm>
-      </p:grpSpPr>
-      <p:sp>
-        <p:nvSpPr>
-          <p:cNvPr id="2" name="Titel 1"/>
-          <p:cNvSpPr>
-            <a:spLocks noGrp="1"/>
-          </p:cNvSpPr>
-          <p:nvPr>
-            <p:ph type="title"/>
-          </p:nvPr>
-        </p:nvSpPr>
-        <p:spPr/>
-        <p:txBody>
-          <a:bodyPr/>
-          <a:lstStyle/>
-          <a:p>
-            <a:r>
-              <a:rPr lang="en-GB" dirty="0" smtClean="0"/>
-              <a:t>2.2 Map network drive</a:t>
-            </a:r>
-            <a:endParaRPr lang="en-GB" dirty="0"/>
-          </a:p>
-        </p:txBody>
-      </p:sp>
-      <p:sp>
-        <p:nvSpPr>
-          <p:cNvPr id="3" name="Inhaltsplatzhalter 2"/>
-          <p:cNvSpPr>
-            <a:spLocks noGrp="1"/>
-          </p:cNvSpPr>
-          <p:nvPr>
-            <p:ph idx="1"/>
-          </p:nvPr>
-        </p:nvSpPr>
-        <p:spPr/>
-        <p:txBody>
-          <a:bodyPr>
-            <a:normAutofit/>
-          </a:bodyPr>
-          <a:lstStyle/>
-          <a:p>
-            <a:r>
-              <a:rPr lang="en-GB" sz="2800" dirty="0" smtClean="0"/>
-              <a:t>Enter the username from the other computer as well as password</a:t>
-            </a:r>
-          </a:p>
-          <a:p>
-            <a:endParaRPr lang="en-GB" sz="2800" dirty="0" smtClean="0"/>
-          </a:p>
-          <a:p>
-            <a:r>
-              <a:rPr lang="en-GB" sz="2800" dirty="0" smtClean="0"/>
-              <a:t>Check the box below</a:t>
-            </a:r>
-            <a:endParaRPr lang="en-GB" sz="2800" dirty="0"/>
-          </a:p>
-        </p:txBody>
-      </p:sp>
-      <p:pic>
-        <p:nvPicPr>
-          <p:cNvPr id="7170" name="Picture 2" descr="C:\Users\nexolight\Desktop\Share\3.PNG"/>
-          <p:cNvPicPr>
-            <a:picLocks noChangeAspect="1" noChangeArrowheads="1"/>
-          </p:cNvPicPr>
-          <p:nvPr/>
-        </p:nvPicPr>
-        <p:blipFill>
-          <a:blip r:embed="rId2">
-            <a:extLst>
-              <a:ext uri="{28A0092B-C50C-407E-A947-70E740481C1C}">
-                <a14:useLocalDpi xmlns:a14="http://schemas.microsoft.com/office/drawing/2010/main" val="0"/>
-              </a:ext>
-            </a:extLst>
-          </a:blip>
-          <a:srcRect/>
-          <a:stretch>
-            <a:fillRect/>
-          </a:stretch>
-        </p:blipFill>
-        <p:spPr bwMode="auto">
-          <a:xfrm>
-            <a:off x="4139952" y="4005064"/>
-            <a:ext cx="3695700" cy="1428750"/>
-          </a:xfrm>
-          <a:prstGeom prst="rect">
-            <a:avLst/>
-          </a:prstGeom>
-          <a:noFill/>
-          <a:extLst>
-            <a:ext uri="{909E8E84-426E-40DD-AFC4-6F175D3DCCD1}">
-              <a14:hiddenFill xmlns:a14="http://schemas.microsoft.com/office/drawing/2010/main">
-                <a:solidFill>
-                  <a:srgbClr val="FFFFFF"/>
-                </a:solidFill>
-              </a14:hiddenFill>
-            </a:ext>
-          </a:extLst>
-        </p:spPr>
-      </p:pic>
-    </p:spTree>
-    <p:extLst>
-      <p:ext uri="{BB962C8B-B14F-4D97-AF65-F5344CB8AC3E}">
-        <p14:creationId xmlns:p14="http://schemas.microsoft.com/office/powerpoint/2010/main" val="3109221976"/>
-      </p:ext>
-    </p:extLst>
-  </p:cSld>
-  <p:clrMapOvr>
-    <a:masterClrMapping/>
-  </p:clrMapOvr>
-  <p:timing>
-    <p:tnLst>
-      <p:par>
-        <p:cTn id="1" dur="indefinite" restart="never" nodeType="tmRoot"/>
-      </p:par>
-    </p:tnLst>
-  </p:timing>
-</p:sld>
-</file>
-
-<file path=ppt/slides/slide9.xml><?xml version="1.0" encoding="utf-8"?>
-<p:sld xmlns:a="http://schemas.openxmlformats.org/drawingml/2006/main" xmlns:r="http://schemas.openxmlformats.org/officeDocument/2006/relationships" xmlns:p="http://schemas.openxmlformats.org/presentationml/2006/main">
-  <p:cSld>
-    <p:spTree>
-      <p:nvGrpSpPr>
-        <p:cNvPr id="1" name=""/>
-        <p:cNvGrpSpPr/>
-        <p:nvPr/>
-      </p:nvGrpSpPr>
-      <p:grpSpPr>
-        <a:xfrm>
-          <a:off x="0" y="0"/>
-          <a:ext cx="0" cy="0"/>
-          <a:chOff x="0" y="0"/>
-          <a:chExt cx="0" cy="0"/>
-        </a:xfrm>
-      </p:grpSpPr>
-      <p:sp>
-        <p:nvSpPr>
-          <p:cNvPr id="2" name="Titel 1"/>
-          <p:cNvSpPr>
-            <a:spLocks noGrp="1"/>
-          </p:cNvSpPr>
-          <p:nvPr>
-            <p:ph type="title"/>
-          </p:nvPr>
-        </p:nvSpPr>
-        <p:spPr/>
-        <p:txBody>
-          <a:bodyPr/>
-          <a:lstStyle/>
-          <a:p>
-            <a:r>
-              <a:rPr lang="en-GB" dirty="0" smtClean="0"/>
-              <a:t>2.3 Map network drive</a:t>
-            </a:r>
-            <a:endParaRPr lang="en-GB" dirty="0"/>
-          </a:p>
-        </p:txBody>
-      </p:sp>
-      <p:sp>
-        <p:nvSpPr>
-          <p:cNvPr id="3" name="Inhaltsplatzhalter 2"/>
-          <p:cNvSpPr>
-            <a:spLocks noGrp="1"/>
-          </p:cNvSpPr>
-          <p:nvPr>
-            <p:ph idx="1"/>
-          </p:nvPr>
-        </p:nvSpPr>
-        <p:spPr/>
-        <p:txBody>
-          <a:bodyPr/>
-          <a:lstStyle/>
-          <a:p>
-            <a:r>
-              <a:rPr lang="de-CH" dirty="0" err="1" smtClean="0"/>
-              <a:t>You</a:t>
-            </a:r>
-            <a:r>
-              <a:rPr lang="de-CH" dirty="0" smtClean="0"/>
-              <a:t> </a:t>
-            </a:r>
-            <a:r>
-              <a:rPr lang="de-CH" dirty="0" err="1" smtClean="0"/>
-              <a:t>should</a:t>
-            </a:r>
-            <a:r>
-              <a:rPr lang="de-CH" dirty="0" smtClean="0"/>
-              <a:t> </a:t>
-            </a:r>
-            <a:r>
-              <a:rPr lang="de-CH" dirty="0" err="1" smtClean="0"/>
-              <a:t>be</a:t>
-            </a:r>
-            <a:r>
-              <a:rPr lang="de-CH" dirty="0" smtClean="0"/>
-              <a:t> </a:t>
-            </a:r>
-            <a:r>
-              <a:rPr lang="de-CH" dirty="0" err="1" smtClean="0"/>
-              <a:t>done</a:t>
-            </a:r>
-            <a:r>
-              <a:rPr lang="de-CH" dirty="0" smtClean="0"/>
-              <a:t> </a:t>
-            </a:r>
-            <a:r>
-              <a:rPr lang="de-CH" dirty="0" err="1" smtClean="0"/>
-              <a:t>if</a:t>
-            </a:r>
-            <a:r>
-              <a:rPr lang="de-CH" dirty="0" smtClean="0"/>
-              <a:t> </a:t>
-            </a:r>
-            <a:r>
-              <a:rPr lang="de-CH" dirty="0" err="1" smtClean="0"/>
-              <a:t>drive</a:t>
-            </a:r>
-            <a:r>
-              <a:rPr lang="de-CH" dirty="0" smtClean="0"/>
-              <a:t> Z </a:t>
-            </a:r>
-            <a:r>
-              <a:rPr lang="de-CH" dirty="0" err="1" smtClean="0"/>
-              <a:t>appears</a:t>
-            </a:r>
-            <a:r>
-              <a:rPr lang="de-CH" dirty="0" smtClean="0"/>
-              <a:t> in «</a:t>
-            </a:r>
-            <a:r>
-              <a:rPr lang="de-CH" dirty="0" err="1" smtClean="0"/>
-              <a:t>My</a:t>
-            </a:r>
-            <a:r>
-              <a:rPr lang="de-CH" dirty="0" smtClean="0"/>
-              <a:t> Computer»</a:t>
-            </a:r>
-          </a:p>
-          <a:p>
-            <a:endParaRPr lang="de-CH" dirty="0"/>
-          </a:p>
-        </p:txBody>
-      </p:sp>
-      <p:pic>
-        <p:nvPicPr>
-          <p:cNvPr id="8195" name="Picture 3" descr="C:\Users\nexolight\Desktop\x.png"/>
-          <p:cNvPicPr>
-            <a:picLocks noChangeAspect="1" noChangeArrowheads="1"/>
-          </p:cNvPicPr>
-          <p:nvPr/>
-        </p:nvPicPr>
-        <p:blipFill>
-          <a:blip r:embed="rId2">
-            <a:extLst>
-              <a:ext uri="{28A0092B-C50C-407E-A947-70E740481C1C}">
-                <a14:useLocalDpi xmlns:a14="http://schemas.microsoft.com/office/drawing/2010/main" val="0"/>
-              </a:ext>
-            </a:extLst>
-          </a:blip>
-          <a:srcRect/>
-          <a:stretch>
-            <a:fillRect/>
-          </a:stretch>
-        </p:blipFill>
-        <p:spPr bwMode="auto">
-          <a:xfrm>
-            <a:off x="5076056" y="4365104"/>
-            <a:ext cx="2505075" cy="914400"/>
-          </a:xfrm>
-          <a:prstGeom prst="rect">
-            <a:avLst/>
-          </a:prstGeom>
-          <a:noFill/>
-          <a:extLst>
-            <a:ext uri="{909E8E84-426E-40DD-AFC4-6F175D3DCCD1}">
-              <a14:hiddenFill xmlns:a14="http://schemas.microsoft.com/office/drawing/2010/main">
-                <a:solidFill>
-                  <a:srgbClr val="FFFFFF"/>
-                </a:solidFill>
-              </a14:hiddenFill>
-            </a:ext>
-          </a:extLst>
-        </p:spPr>
-      </p:pic>
-    </p:spTree>
-    <p:extLst>
-      <p:ext uri="{BB962C8B-B14F-4D97-AF65-F5344CB8AC3E}">
-        <p14:creationId xmlns:p14="http://schemas.microsoft.com/office/powerpoint/2010/main" val="733535802"/>
       </p:ext>
     </p:extLst>
   </p:cSld>

</xml_diff>